<commit_message>
spring hateoas documantation with swagger
</commit_message>
<xml_diff>
--- a/documentation/Spring_HATEOAS.pptx
+++ b/documentation/Spring_HATEOAS.pptx
@@ -9,10 +9,10 @@
     <p:sldMasterId id="2147483713" r:id="rId5"/>
   </p:sldMasterIdLst>
   <p:notesMasterIdLst>
-    <p:notesMasterId r:id="rId17"/>
+    <p:notesMasterId r:id="rId19"/>
   </p:notesMasterIdLst>
   <p:handoutMasterIdLst>
-    <p:handoutMasterId r:id="rId18"/>
+    <p:handoutMasterId r:id="rId20"/>
   </p:handoutMasterIdLst>
   <p:sldIdLst>
     <p:sldId id="294" r:id="rId6"/>
@@ -26,6 +26,8 @@
     <p:sldId id="400" r:id="rId14"/>
     <p:sldId id="401" r:id="rId15"/>
     <p:sldId id="402" r:id="rId16"/>
+    <p:sldId id="403" r:id="rId17"/>
+    <p:sldId id="404" r:id="rId18"/>
   </p:sldIdLst>
   <p:sldSz cx="9144000" cy="5143500" type="screen16x9"/>
   <p:notesSz cx="6858000" cy="9144000"/>
@@ -148,6 +150,8 @@
             <p14:sldId id="400"/>
             <p14:sldId id="401"/>
             <p14:sldId id="402"/>
+            <p14:sldId id="403"/>
+            <p14:sldId id="404"/>
           </p14:sldIdLst>
         </p14:section>
       </p14:sectionLst>
@@ -272,7 +276,7 @@
           <a:p>
             <a:fld id="{78617FD8-3C79-8D45-A2C8-4B6BBD51E2EE}" type="datetimeFigureOut">
               <a:rPr lang="de-DE" smtClean="0"/>
-              <a:t>02.03.2018</a:t>
+              <a:t>05.03.2018</a:t>
             </a:fld>
             <a:endParaRPr lang="de-DE"/>
           </a:p>
@@ -437,7 +441,7 @@
           <a:p>
             <a:fld id="{74051A69-C562-4FC5-92DC-994CDC1376A2}" type="datetimeFigureOut">
               <a:rPr lang="en-US" smtClean="0"/>
-              <a:t>02.03.2018</a:t>
+              <a:t>05.03.2018</a:t>
             </a:fld>
             <a:endParaRPr lang="en-US"/>
           </a:p>
@@ -779,6 +783,174 @@
     <p:extLst>
       <p:ext uri="{BB962C8B-B14F-4D97-AF65-F5344CB8AC3E}">
         <p14:creationId xmlns:p14="http://schemas.microsoft.com/office/powerpoint/2010/main" val="1634869528"/>
+      </p:ext>
+    </p:extLst>
+  </p:cSld>
+  <p:clrMapOvr>
+    <a:masterClrMapping/>
+  </p:clrMapOvr>
+</p:notes>
+</file>
+
+<file path=ppt/notesSlides/notesSlide10.xml><?xml version="1.0" encoding="utf-8"?>
+<p:notes xmlns:a="http://schemas.openxmlformats.org/drawingml/2006/main" xmlns:r="http://schemas.openxmlformats.org/officeDocument/2006/relationships" xmlns:p="http://schemas.openxmlformats.org/presentationml/2006/main">
+  <p:cSld>
+    <p:spTree>
+      <p:nvGrpSpPr>
+        <p:cNvPr id="1" name=""/>
+        <p:cNvGrpSpPr/>
+        <p:nvPr/>
+      </p:nvGrpSpPr>
+      <p:grpSpPr>
+        <a:xfrm>
+          <a:off x="0" y="0"/>
+          <a:ext cx="0" cy="0"/>
+          <a:chOff x="0" y="0"/>
+          <a:chExt cx="0" cy="0"/>
+        </a:xfrm>
+      </p:grpSpPr>
+      <p:sp>
+        <p:nvSpPr>
+          <p:cNvPr id="2" name="Folienbildplatzhalter 1"/>
+          <p:cNvSpPr>
+            <a:spLocks noGrp="1" noRot="1" noChangeAspect="1"/>
+          </p:cNvSpPr>
+          <p:nvPr>
+            <p:ph type="sldImg"/>
+          </p:nvPr>
+        </p:nvSpPr>
+        <p:spPr/>
+      </p:sp>
+      <p:sp>
+        <p:nvSpPr>
+          <p:cNvPr id="3" name="Notizenplatzhalter 2"/>
+          <p:cNvSpPr>
+            <a:spLocks noGrp="1"/>
+          </p:cNvSpPr>
+          <p:nvPr>
+            <p:ph type="body" idx="1"/>
+          </p:nvPr>
+        </p:nvSpPr>
+        <p:spPr/>
+        <p:txBody>
+          <a:bodyPr/>
+          <a:lstStyle/>
+          <a:p>
+            <a:endParaRPr lang="de-DE" dirty="0"/>
+          </a:p>
+        </p:txBody>
+      </p:sp>
+      <p:sp>
+        <p:nvSpPr>
+          <p:cNvPr id="4" name="Foliennummernplatzhalter 3"/>
+          <p:cNvSpPr>
+            <a:spLocks noGrp="1"/>
+          </p:cNvSpPr>
+          <p:nvPr>
+            <p:ph type="sldNum" sz="quarter" idx="10"/>
+          </p:nvPr>
+        </p:nvSpPr>
+        <p:spPr/>
+        <p:txBody>
+          <a:bodyPr/>
+          <a:lstStyle/>
+          <a:p>
+            <a:fld id="{8C747B73-6B03-4EF3-AD40-683CE00DABF6}" type="slidenum">
+              <a:rPr lang="en-US" smtClean="0"/>
+              <a:t>12</a:t>
+            </a:fld>
+            <a:endParaRPr lang="en-US"/>
+          </a:p>
+        </p:txBody>
+      </p:sp>
+    </p:spTree>
+    <p:extLst>
+      <p:ext uri="{BB962C8B-B14F-4D97-AF65-F5344CB8AC3E}">
+        <p14:creationId xmlns:p14="http://schemas.microsoft.com/office/powerpoint/2010/main" val="1816368817"/>
+      </p:ext>
+    </p:extLst>
+  </p:cSld>
+  <p:clrMapOvr>
+    <a:masterClrMapping/>
+  </p:clrMapOvr>
+</p:notes>
+</file>
+
+<file path=ppt/notesSlides/notesSlide11.xml><?xml version="1.0" encoding="utf-8"?>
+<p:notes xmlns:a="http://schemas.openxmlformats.org/drawingml/2006/main" xmlns:r="http://schemas.openxmlformats.org/officeDocument/2006/relationships" xmlns:p="http://schemas.openxmlformats.org/presentationml/2006/main">
+  <p:cSld>
+    <p:spTree>
+      <p:nvGrpSpPr>
+        <p:cNvPr id="1" name=""/>
+        <p:cNvGrpSpPr/>
+        <p:nvPr/>
+      </p:nvGrpSpPr>
+      <p:grpSpPr>
+        <a:xfrm>
+          <a:off x="0" y="0"/>
+          <a:ext cx="0" cy="0"/>
+          <a:chOff x="0" y="0"/>
+          <a:chExt cx="0" cy="0"/>
+        </a:xfrm>
+      </p:grpSpPr>
+      <p:sp>
+        <p:nvSpPr>
+          <p:cNvPr id="2" name="Folienbildplatzhalter 1"/>
+          <p:cNvSpPr>
+            <a:spLocks noGrp="1" noRot="1" noChangeAspect="1"/>
+          </p:cNvSpPr>
+          <p:nvPr>
+            <p:ph type="sldImg"/>
+          </p:nvPr>
+        </p:nvSpPr>
+        <p:spPr/>
+      </p:sp>
+      <p:sp>
+        <p:nvSpPr>
+          <p:cNvPr id="3" name="Notizenplatzhalter 2"/>
+          <p:cNvSpPr>
+            <a:spLocks noGrp="1"/>
+          </p:cNvSpPr>
+          <p:nvPr>
+            <p:ph type="body" idx="1"/>
+          </p:nvPr>
+        </p:nvSpPr>
+        <p:spPr/>
+        <p:txBody>
+          <a:bodyPr/>
+          <a:lstStyle/>
+          <a:p>
+            <a:endParaRPr lang="de-DE" dirty="0"/>
+          </a:p>
+        </p:txBody>
+      </p:sp>
+      <p:sp>
+        <p:nvSpPr>
+          <p:cNvPr id="4" name="Foliennummernplatzhalter 3"/>
+          <p:cNvSpPr>
+            <a:spLocks noGrp="1"/>
+          </p:cNvSpPr>
+          <p:nvPr>
+            <p:ph type="sldNum" sz="quarter" idx="10"/>
+          </p:nvPr>
+        </p:nvSpPr>
+        <p:spPr/>
+        <p:txBody>
+          <a:bodyPr/>
+          <a:lstStyle/>
+          <a:p>
+            <a:fld id="{8C747B73-6B03-4EF3-AD40-683CE00DABF6}" type="slidenum">
+              <a:rPr lang="en-US" smtClean="0"/>
+              <a:t>13</a:t>
+            </a:fld>
+            <a:endParaRPr lang="en-US"/>
+          </a:p>
+        </p:txBody>
+      </p:sp>
+    </p:spTree>
+    <p:extLst>
+      <p:ext uri="{BB962C8B-B14F-4D97-AF65-F5344CB8AC3E}">
+        <p14:creationId xmlns:p14="http://schemas.microsoft.com/office/powerpoint/2010/main" val="3382527712"/>
       </p:ext>
     </p:extLst>
   </p:cSld>
@@ -11803,7 +11975,7 @@
           <a:p>
             <a:r>
               <a:rPr lang="de-DE" dirty="0"/>
-              <a:t>How to write rest controller</a:t>
+              <a:t>How to write dto/entity converters</a:t>
             </a:r>
           </a:p>
         </p:txBody>
@@ -11825,7 +11997,7 @@
           <a:p>
             <a:r>
               <a:rPr lang="de-DE" dirty="0"/>
-              <a:t>Rest controller</a:t>
+              <a:t>Dto converters</a:t>
             </a:r>
           </a:p>
         </p:txBody>
@@ -12066,13 +12238,7 @@
               <a:rPr lang="en-US" dirty="0">
                 <a:hlinkClick r:id="rId3"/>
               </a:rPr>
-              <a:t>Configuration </a:t>
-            </a:r>
-            <a:r>
-              <a:rPr lang="en-US" dirty="0">
-                <a:hlinkClick r:id="rId3"/>
-              </a:rPr>
-              <a:t>example</a:t>
+              <a:t>Configuration example</a:t>
             </a:r>
             <a:endParaRPr lang="en-US" dirty="0"/>
           </a:p>
@@ -12123,6 +12289,1277 @@
     <p:extLst>
       <p:ext uri="{BB962C8B-B14F-4D97-AF65-F5344CB8AC3E}">
         <p14:creationId xmlns:p14="http://schemas.microsoft.com/office/powerpoint/2010/main" val="1598705105"/>
+      </p:ext>
+    </p:extLst>
+  </p:cSld>
+  <p:clrMapOvr>
+    <a:masterClrMapping/>
+  </p:clrMapOvr>
+</p:sld>
+</file>
+
+<file path=ppt/slides/slide12.xml><?xml version="1.0" encoding="utf-8"?>
+<p:sld xmlns:a="http://schemas.openxmlformats.org/drawingml/2006/main" xmlns:r="http://schemas.openxmlformats.org/officeDocument/2006/relationships" xmlns:p="http://schemas.openxmlformats.org/presentationml/2006/main">
+  <p:cSld>
+    <p:spTree>
+      <p:nvGrpSpPr>
+        <p:cNvPr id="1" name=""/>
+        <p:cNvGrpSpPr/>
+        <p:nvPr/>
+      </p:nvGrpSpPr>
+      <p:grpSpPr>
+        <a:xfrm>
+          <a:off x="0" y="0"/>
+          <a:ext cx="0" cy="0"/>
+          <a:chOff x="0" y="0"/>
+          <a:chExt cx="0" cy="0"/>
+        </a:xfrm>
+      </p:grpSpPr>
+      <p:sp>
+        <p:nvSpPr>
+          <p:cNvPr id="2" name="Textplatzhalter 1"/>
+          <p:cNvSpPr>
+            <a:spLocks noGrp="1"/>
+          </p:cNvSpPr>
+          <p:nvPr>
+            <p:ph type="body" sz="quarter" idx="16"/>
+          </p:nvPr>
+        </p:nvSpPr>
+        <p:spPr/>
+        <p:txBody>
+          <a:bodyPr/>
+          <a:lstStyle/>
+          <a:p>
+            <a:r>
+              <a:rPr lang="de-DE" dirty="0"/>
+              <a:t>REST API DOCS library</a:t>
+            </a:r>
+          </a:p>
+        </p:txBody>
+      </p:sp>
+      <p:sp>
+        <p:nvSpPr>
+          <p:cNvPr id="3" name="Textplatzhalter 2"/>
+          <p:cNvSpPr>
+            <a:spLocks noGrp="1"/>
+          </p:cNvSpPr>
+          <p:nvPr>
+            <p:ph type="body" sz="quarter" idx="15"/>
+          </p:nvPr>
+        </p:nvSpPr>
+        <p:spPr/>
+        <p:txBody>
+          <a:bodyPr/>
+          <a:lstStyle/>
+          <a:p>
+            <a:r>
+              <a:rPr lang="de-DE" dirty="0"/>
+              <a:t>API DOcumentation</a:t>
+            </a:r>
+          </a:p>
+        </p:txBody>
+      </p:sp>
+      <p:sp>
+        <p:nvSpPr>
+          <p:cNvPr id="6" name="Rectangle 1">
+            <a:extLst>
+              <a:ext uri="{FF2B5EF4-FFF2-40B4-BE49-F238E27FC236}">
+                <a16:creationId xmlns:a16="http://schemas.microsoft.com/office/drawing/2014/main" id="{0441C3E8-F8F2-4438-AC0E-DB0D8FA3D95C}"/>
+              </a:ext>
+            </a:extLst>
+          </p:cNvPr>
+          <p:cNvSpPr>
+            <a:spLocks noChangeArrowheads="1"/>
+          </p:cNvSpPr>
+          <p:nvPr/>
+        </p:nvSpPr>
+        <p:spPr bwMode="auto">
+          <a:xfrm>
+            <a:off x="0" y="43934"/>
+            <a:ext cx="184731" cy="369332"/>
+          </a:xfrm>
+          <a:prstGeom prst="rect">
+            <a:avLst/>
+          </a:prstGeom>
+          <a:solidFill>
+            <a:srgbClr val="FFFFFF"/>
+          </a:solidFill>
+          <a:ln>
+            <a:noFill/>
+          </a:ln>
+          <a:effectLst/>
+          <a:extLst>
+            <a:ext uri="{91240B29-F687-4F45-9708-019B960494DF}">
+              <a14:hiddenLine xmlns:a14="http://schemas.microsoft.com/office/drawing/2010/main" w="9525">
+                <a:solidFill>
+                  <a:schemeClr val="tx1"/>
+                </a:solidFill>
+                <a:miter lim="800000"/>
+                <a:headEnd/>
+                <a:tailEnd/>
+              </a14:hiddenLine>
+            </a:ext>
+            <a:ext uri="{AF507438-7753-43E0-B8FC-AC1667EBCBE1}">
+              <a14:hiddenEffects xmlns:a14="http://schemas.microsoft.com/office/drawing/2010/main">
+                <a:effectLst>
+                  <a:outerShdw dist="35921" dir="2700000" algn="ctr" rotWithShape="0">
+                    <a:schemeClr val="bg2"/>
+                  </a:outerShdw>
+                </a:effectLst>
+              </a14:hiddenEffects>
+            </a:ext>
+          </a:extLst>
+        </p:spPr>
+        <p:txBody>
+          <a:bodyPr vert="horz" wrap="none" lIns="91440" tIns="45720" rIns="91440" bIns="45720" numCol="1" anchor="ctr" anchorCtr="0" compatLnSpc="1">
+            <a:prstTxWarp prst="textNoShape">
+              <a:avLst/>
+            </a:prstTxWarp>
+            <a:spAutoFit/>
+          </a:bodyPr>
+          <a:lstStyle/>
+          <a:p>
+            <a:pPr marL="0" marR="0" lvl="0" indent="0" algn="l" defTabSz="914400" rtl="0" eaLnBrk="0" fontAlgn="base" latinLnBrk="0" hangingPunct="0">
+              <a:lnSpc>
+                <a:spcPct val="100000"/>
+              </a:lnSpc>
+              <a:spcBef>
+                <a:spcPct val="0"/>
+              </a:spcBef>
+              <a:spcAft>
+                <a:spcPct val="0"/>
+              </a:spcAft>
+              <a:buClrTx/>
+              <a:buSzTx/>
+              <a:buFontTx/>
+              <a:buNone/>
+              <a:tabLst/>
+            </a:pPr>
+            <a:endParaRPr kumimoji="0" lang="en-US" altLang="en-US" sz="1800" b="0" i="0" u="none" strike="noStrike" cap="none" normalizeH="0" baseline="0" dirty="0">
+              <a:ln>
+                <a:noFill/>
+              </a:ln>
+              <a:solidFill>
+                <a:schemeClr val="tx1"/>
+              </a:solidFill>
+              <a:effectLst/>
+              <a:latin typeface="Arial" panose="020B0604020202020204" pitchFamily="34" charset="0"/>
+            </a:endParaRPr>
+          </a:p>
+        </p:txBody>
+      </p:sp>
+      <p:sp>
+        <p:nvSpPr>
+          <p:cNvPr id="8" name="Rectangle 7">
+            <a:extLst>
+              <a:ext uri="{FF2B5EF4-FFF2-40B4-BE49-F238E27FC236}">
+                <a16:creationId xmlns:a16="http://schemas.microsoft.com/office/drawing/2014/main" id="{10D24712-897D-4BD4-86F1-A4AC878BF7A9}"/>
+              </a:ext>
+            </a:extLst>
+          </p:cNvPr>
+          <p:cNvSpPr/>
+          <p:nvPr/>
+        </p:nvSpPr>
+        <p:spPr>
+          <a:xfrm>
+            <a:off x="1128489" y="1198881"/>
+            <a:ext cx="6781681" cy="3262432"/>
+          </a:xfrm>
+          <a:prstGeom prst="rect">
+            <a:avLst/>
+          </a:prstGeom>
+        </p:spPr>
+        <p:txBody>
+          <a:bodyPr wrap="square">
+            <a:spAutoFit/>
+          </a:bodyPr>
+          <a:lstStyle/>
+          <a:p>
+            <a:pPr marL="285750" indent="-285750" fontAlgn="base">
+              <a:buClr>
+                <a:schemeClr val="tx2"/>
+              </a:buClr>
+              <a:buFont typeface="Wingdings" panose="05000000000000000000" pitchFamily="2" charset="2"/>
+              <a:buChar char="Ø"/>
+            </a:pPr>
+            <a:r>
+              <a:rPr lang="en-US" sz="1200" dirty="0"/>
+              <a:t>REST API should be well documented, nowadays we have many libraries help us to do it: </a:t>
+            </a:r>
+          </a:p>
+          <a:p>
+            <a:pPr marL="628601" lvl="1" indent="-285750" fontAlgn="base">
+              <a:buClr>
+                <a:schemeClr val="tx2"/>
+              </a:buClr>
+              <a:buFont typeface="Wingdings" panose="05000000000000000000" pitchFamily="2" charset="2"/>
+              <a:buChar char="Ø"/>
+            </a:pPr>
+            <a:r>
+              <a:rPr lang="en-US" sz="1200" dirty="0"/>
+              <a:t>Swagger</a:t>
+            </a:r>
+          </a:p>
+          <a:p>
+            <a:pPr marL="628601" lvl="1" indent="-285750" fontAlgn="base">
+              <a:buClr>
+                <a:schemeClr val="tx2"/>
+              </a:buClr>
+              <a:buFont typeface="Wingdings" panose="05000000000000000000" pitchFamily="2" charset="2"/>
+              <a:buChar char="Ø"/>
+            </a:pPr>
+            <a:r>
+              <a:rPr lang="en-US" sz="1200" dirty="0"/>
+              <a:t>Spring Rest Doc</a:t>
+            </a:r>
+          </a:p>
+          <a:p>
+            <a:pPr marL="628601" lvl="1" indent="-285750" fontAlgn="base">
+              <a:buClr>
+                <a:schemeClr val="tx2"/>
+              </a:buClr>
+              <a:buFont typeface="Wingdings" panose="05000000000000000000" pitchFamily="2" charset="2"/>
+              <a:buChar char="Ø"/>
+            </a:pPr>
+            <a:r>
+              <a:rPr lang="en-US" sz="1200" dirty="0"/>
+              <a:t>Etc.</a:t>
+            </a:r>
+          </a:p>
+          <a:p>
+            <a:pPr marL="285750" indent="-285750" fontAlgn="base">
+              <a:buClr>
+                <a:schemeClr val="tx2"/>
+              </a:buClr>
+              <a:buFont typeface="Wingdings" panose="05000000000000000000" pitchFamily="2" charset="2"/>
+              <a:buChar char="Ø"/>
+            </a:pPr>
+            <a:r>
+              <a:rPr lang="en-US" sz="1200" dirty="0"/>
+              <a:t>Setup swagger</a:t>
+            </a:r>
+          </a:p>
+          <a:p>
+            <a:pPr marL="628601" lvl="1" indent="-285750" fontAlgn="base">
+              <a:buClr>
+                <a:schemeClr val="tx2"/>
+              </a:buClr>
+              <a:buFont typeface="Wingdings" panose="05000000000000000000" pitchFamily="2" charset="2"/>
+              <a:buChar char="Ø"/>
+            </a:pPr>
+            <a:r>
+              <a:rPr lang="en-US" sz="1200" dirty="0"/>
+              <a:t>Include dependency in </a:t>
+            </a:r>
+            <a:r>
+              <a:rPr lang="en-US" sz="1200" dirty="0">
+                <a:hlinkClick r:id="rId3"/>
+              </a:rPr>
+              <a:t>pom.xml</a:t>
+            </a:r>
+            <a:r>
+              <a:rPr lang="en-US" sz="1200" dirty="0"/>
+              <a:t>  </a:t>
+            </a:r>
+          </a:p>
+          <a:p>
+            <a:pPr marL="971452" lvl="2" indent="-285750" fontAlgn="base">
+              <a:buClr>
+                <a:schemeClr val="tx2"/>
+              </a:buClr>
+              <a:buFont typeface="Wingdings" panose="05000000000000000000" pitchFamily="2" charset="2"/>
+              <a:buChar char="Ø"/>
+            </a:pPr>
+            <a:r>
+              <a:rPr lang="en-US" altLang="en-US" sz="1200" b="1" dirty="0" err="1">
+                <a:solidFill>
+                  <a:srgbClr val="000080"/>
+                </a:solidFill>
+                <a:latin typeface="Source Code Pro"/>
+              </a:rPr>
+              <a:t>groupId</a:t>
+            </a:r>
+            <a:r>
+              <a:rPr lang="en-US" altLang="en-US" sz="1200" b="1" dirty="0">
+                <a:solidFill>
+                  <a:srgbClr val="000000"/>
+                </a:solidFill>
+                <a:latin typeface="Source Code Pro"/>
+              </a:rPr>
+              <a:t>: </a:t>
+            </a:r>
+            <a:r>
+              <a:rPr lang="en-US" altLang="en-US" sz="1200" dirty="0" err="1">
+                <a:solidFill>
+                  <a:srgbClr val="000000"/>
+                </a:solidFill>
+                <a:latin typeface="Source Code Pro"/>
+              </a:rPr>
+              <a:t>io.springfox</a:t>
+            </a:r>
+            <a:endParaRPr lang="en-US" altLang="en-US" sz="1200" dirty="0">
+              <a:solidFill>
+                <a:srgbClr val="000000"/>
+              </a:solidFill>
+              <a:latin typeface="Source Code Pro"/>
+            </a:endParaRPr>
+          </a:p>
+          <a:p>
+            <a:pPr marL="1314302" lvl="3" indent="-285750" fontAlgn="base">
+              <a:buClr>
+                <a:schemeClr val="tx2"/>
+              </a:buClr>
+              <a:buFont typeface="Wingdings" panose="05000000000000000000" pitchFamily="2" charset="2"/>
+              <a:buChar char="Ø"/>
+            </a:pPr>
+            <a:r>
+              <a:rPr lang="en-US" altLang="en-US" sz="1200" b="1" dirty="0" err="1">
+                <a:solidFill>
+                  <a:srgbClr val="000080"/>
+                </a:solidFill>
+                <a:latin typeface="Source Code Pro"/>
+              </a:rPr>
+              <a:t>artifactId</a:t>
+            </a:r>
+            <a:r>
+              <a:rPr lang="en-US" altLang="en-US" sz="1200" b="1" dirty="0">
+                <a:solidFill>
+                  <a:srgbClr val="000080"/>
+                </a:solidFill>
+                <a:latin typeface="Source Code Pro"/>
+              </a:rPr>
+              <a:t>: </a:t>
+            </a:r>
+            <a:r>
+              <a:rPr lang="en-US" altLang="en-US" sz="1200" dirty="0">
+                <a:solidFill>
+                  <a:srgbClr val="000000"/>
+                </a:solidFill>
+                <a:latin typeface="Source Code Pro"/>
+              </a:rPr>
+              <a:t>springfox-swagger2</a:t>
+            </a:r>
+          </a:p>
+          <a:p>
+            <a:pPr marL="1314302" lvl="3" indent="-285750" fontAlgn="base">
+              <a:buClr>
+                <a:schemeClr val="tx2"/>
+              </a:buClr>
+              <a:buFont typeface="Wingdings" panose="05000000000000000000" pitchFamily="2" charset="2"/>
+              <a:buChar char="Ø"/>
+            </a:pPr>
+            <a:r>
+              <a:rPr lang="en-US" altLang="en-US" sz="1200" b="1" dirty="0" err="1">
+                <a:solidFill>
+                  <a:srgbClr val="000080"/>
+                </a:solidFill>
+                <a:latin typeface="Source Code Pro"/>
+              </a:rPr>
+              <a:t>artifactId</a:t>
+            </a:r>
+            <a:r>
+              <a:rPr lang="en-US" altLang="en-US" sz="1200" b="1" dirty="0">
+                <a:solidFill>
+                  <a:srgbClr val="000000"/>
+                </a:solidFill>
+                <a:latin typeface="Source Code Pro"/>
+              </a:rPr>
+              <a:t>: </a:t>
+            </a:r>
+            <a:r>
+              <a:rPr lang="en-US" altLang="en-US" sz="1200" dirty="0" err="1">
+                <a:solidFill>
+                  <a:srgbClr val="000000"/>
+                </a:solidFill>
+                <a:latin typeface="Source Code Pro"/>
+              </a:rPr>
+              <a:t>springfox</a:t>
+            </a:r>
+            <a:r>
+              <a:rPr lang="en-US" altLang="en-US" sz="1200" dirty="0">
+                <a:solidFill>
+                  <a:srgbClr val="000000"/>
+                </a:solidFill>
+                <a:latin typeface="Source Code Pro"/>
+              </a:rPr>
+              <a:t>-swagger-</a:t>
+            </a:r>
+            <a:r>
+              <a:rPr lang="en-US" altLang="en-US" sz="1200" dirty="0" err="1">
+                <a:solidFill>
+                  <a:srgbClr val="000000"/>
+                </a:solidFill>
+                <a:latin typeface="Source Code Pro"/>
+              </a:rPr>
+              <a:t>ui</a:t>
+            </a:r>
+            <a:endParaRPr lang="en-US" altLang="en-US" sz="1200" dirty="0">
+              <a:solidFill>
+                <a:srgbClr val="000000"/>
+              </a:solidFill>
+              <a:latin typeface="Source Code Pro"/>
+            </a:endParaRPr>
+          </a:p>
+          <a:p>
+            <a:pPr marL="628601" lvl="1" indent="-285750" fontAlgn="base">
+              <a:buClr>
+                <a:schemeClr val="tx2"/>
+              </a:buClr>
+              <a:buFont typeface="Wingdings" panose="05000000000000000000" pitchFamily="2" charset="2"/>
+              <a:buChar char="Ø"/>
+            </a:pPr>
+            <a:r>
+              <a:rPr lang="en-US" altLang="en-US" sz="1200" dirty="0">
+                <a:solidFill>
+                  <a:srgbClr val="000000"/>
+                </a:solidFill>
+              </a:rPr>
+              <a:t>Configure put annotation </a:t>
+            </a:r>
+            <a:r>
+              <a:rPr lang="en-US" altLang="en-US" sz="1200" dirty="0">
+                <a:solidFill>
+                  <a:srgbClr val="808000"/>
+                </a:solidFill>
+                <a:latin typeface="Source Code Pro"/>
+              </a:rPr>
+              <a:t>@EnableSwagger2</a:t>
+            </a:r>
+            <a:r>
+              <a:rPr lang="en-US" altLang="en-US" sz="1200" dirty="0">
+                <a:solidFill>
+                  <a:srgbClr val="000000"/>
+                </a:solidFill>
+              </a:rPr>
+              <a:t> add Docket bean in a</a:t>
+            </a:r>
+            <a:r>
+              <a:rPr lang="en-US" altLang="en-US" sz="1200" dirty="0">
+                <a:solidFill>
+                  <a:srgbClr val="000000"/>
+                </a:solidFill>
+                <a:latin typeface="Source Code Pro"/>
+              </a:rPr>
+              <a:t> </a:t>
+            </a:r>
+            <a:r>
+              <a:rPr lang="en-US" altLang="en-US" sz="1200" dirty="0" err="1">
+                <a:solidFill>
+                  <a:srgbClr val="000000"/>
+                </a:solidFill>
+                <a:latin typeface="Source Code Pro"/>
+                <a:hlinkClick r:id="rId4"/>
+              </a:rPr>
+              <a:t>WebMmvConfigurer</a:t>
+            </a:r>
+            <a:endParaRPr lang="en-US" altLang="en-US" sz="1400" dirty="0">
+              <a:solidFill>
+                <a:srgbClr val="808000"/>
+              </a:solidFill>
+              <a:latin typeface="Source Code Pro"/>
+            </a:endParaRPr>
+          </a:p>
+          <a:p>
+            <a:pPr lvl="1" fontAlgn="base">
+              <a:buClr>
+                <a:schemeClr val="tx2"/>
+              </a:buClr>
+            </a:pPr>
+            <a:r>
+              <a:rPr lang="en-US" altLang="en-US" sz="1400" dirty="0">
+                <a:solidFill>
+                  <a:srgbClr val="808000"/>
+                </a:solidFill>
+                <a:latin typeface="Source Code Pro"/>
+              </a:rPr>
+              <a:t>	</a:t>
+            </a:r>
+            <a:r>
+              <a:rPr lang="en-US" altLang="en-US" sz="1200" dirty="0">
+                <a:solidFill>
+                  <a:srgbClr val="808000"/>
+                </a:solidFill>
+                <a:latin typeface="Source Code Pro"/>
+              </a:rPr>
+              <a:t>@Bean</a:t>
+            </a:r>
+            <a:endParaRPr lang="en-US" altLang="en-US" sz="1200" b="1" dirty="0">
+              <a:solidFill>
+                <a:srgbClr val="000080"/>
+              </a:solidFill>
+              <a:latin typeface="Source Code Pro"/>
+            </a:endParaRPr>
+          </a:p>
+          <a:p>
+            <a:pPr lvl="2" fontAlgn="base">
+              <a:buClr>
+                <a:schemeClr val="tx2"/>
+              </a:buClr>
+            </a:pPr>
+            <a:r>
+              <a:rPr lang="en-US" altLang="en-US" sz="1200" b="1" dirty="0">
+                <a:solidFill>
+                  <a:srgbClr val="000080"/>
+                </a:solidFill>
+                <a:latin typeface="Source Code Pro"/>
+              </a:rPr>
+              <a:t>public </a:t>
+            </a:r>
+            <a:r>
+              <a:rPr lang="en-US" altLang="en-US" sz="1200" dirty="0">
+                <a:solidFill>
+                  <a:srgbClr val="000000"/>
+                </a:solidFill>
+                <a:latin typeface="Source Code Pro"/>
+              </a:rPr>
+              <a:t>Docket </a:t>
+            </a:r>
+            <a:r>
+              <a:rPr lang="en-US" altLang="en-US" sz="1200" dirty="0" err="1">
+                <a:solidFill>
+                  <a:srgbClr val="000000"/>
+                </a:solidFill>
+                <a:latin typeface="Source Code Pro"/>
+              </a:rPr>
+              <a:t>api</a:t>
+            </a:r>
+            <a:r>
+              <a:rPr lang="en-US" altLang="en-US" sz="1200" dirty="0">
+                <a:solidFill>
+                  <a:srgbClr val="000000"/>
+                </a:solidFill>
+                <a:latin typeface="Source Code Pro"/>
+              </a:rPr>
+              <a:t>() {</a:t>
+            </a:r>
+            <a:br>
+              <a:rPr lang="en-US" altLang="en-US" sz="1200" dirty="0">
+                <a:solidFill>
+                  <a:srgbClr val="000000"/>
+                </a:solidFill>
+                <a:latin typeface="Source Code Pro"/>
+              </a:rPr>
+            </a:br>
+            <a:r>
+              <a:rPr lang="en-US" altLang="en-US" sz="1200" dirty="0">
+                <a:solidFill>
+                  <a:srgbClr val="000000"/>
+                </a:solidFill>
+                <a:latin typeface="Source Code Pro"/>
+              </a:rPr>
+              <a:t>    </a:t>
+            </a:r>
+            <a:r>
+              <a:rPr lang="en-US" altLang="en-US" sz="1200" b="1" dirty="0">
+                <a:solidFill>
+                  <a:srgbClr val="000080"/>
+                </a:solidFill>
+                <a:latin typeface="Source Code Pro"/>
+              </a:rPr>
+              <a:t>return new </a:t>
+            </a:r>
+            <a:r>
+              <a:rPr lang="en-US" altLang="en-US" sz="1200" dirty="0">
+                <a:solidFill>
+                  <a:srgbClr val="000000"/>
+                </a:solidFill>
+                <a:latin typeface="Source Code Pro"/>
+              </a:rPr>
+              <a:t>Docket( DocumentationType.</a:t>
+            </a:r>
+            <a:r>
+              <a:rPr lang="en-US" altLang="en-US" sz="1200" b="1" i="1" dirty="0">
+                <a:solidFill>
+                  <a:srgbClr val="660E7A"/>
+                </a:solidFill>
+                <a:latin typeface="Source Code Pro"/>
+              </a:rPr>
+              <a:t>SWAGGER_2 </a:t>
+            </a:r>
+            <a:r>
+              <a:rPr lang="en-US" altLang="en-US" sz="1200" dirty="0">
+                <a:solidFill>
+                  <a:srgbClr val="000000"/>
+                </a:solidFill>
+                <a:latin typeface="Source Code Pro"/>
+              </a:rPr>
+              <a:t>)</a:t>
+            </a:r>
+          </a:p>
+          <a:p>
+            <a:pPr lvl="2" fontAlgn="base">
+              <a:buClr>
+                <a:schemeClr val="tx2"/>
+              </a:buClr>
+            </a:pPr>
+            <a:r>
+              <a:rPr lang="en-US" altLang="en-US" sz="1200" dirty="0">
+                <a:solidFill>
+                  <a:srgbClr val="000000"/>
+                </a:solidFill>
+                <a:latin typeface="Source Code Pro"/>
+              </a:rPr>
+              <a:t>	.select().</a:t>
+            </a:r>
+            <a:r>
+              <a:rPr lang="en-US" altLang="en-US" sz="1200" dirty="0" err="1">
+                <a:solidFill>
+                  <a:srgbClr val="000000"/>
+                </a:solidFill>
+                <a:latin typeface="Source Code Pro"/>
+              </a:rPr>
+              <a:t>apis</a:t>
+            </a:r>
+            <a:r>
+              <a:rPr lang="en-US" altLang="en-US" sz="1200" dirty="0">
+                <a:solidFill>
+                  <a:srgbClr val="000000"/>
+                </a:solidFill>
+                <a:latin typeface="Source Code Pro"/>
+              </a:rPr>
+              <a:t>( </a:t>
+            </a:r>
+            <a:r>
+              <a:rPr lang="en-US" altLang="en-US" sz="1200" dirty="0" err="1">
+                <a:solidFill>
+                  <a:srgbClr val="000000"/>
+                </a:solidFill>
+                <a:latin typeface="Source Code Pro"/>
+              </a:rPr>
+              <a:t>RequestHandlerSelectors.</a:t>
+            </a:r>
+            <a:r>
+              <a:rPr lang="en-US" altLang="en-US" sz="1200" i="1" dirty="0" err="1">
+                <a:solidFill>
+                  <a:srgbClr val="000000"/>
+                </a:solidFill>
+                <a:latin typeface="Source Code Pro"/>
+              </a:rPr>
+              <a:t>any</a:t>
+            </a:r>
+            <a:r>
+              <a:rPr lang="en-US" altLang="en-US" sz="1200" dirty="0">
+                <a:solidFill>
+                  <a:srgbClr val="000000"/>
+                </a:solidFill>
+                <a:latin typeface="Source Code Pro"/>
+              </a:rPr>
+              <a:t>() )</a:t>
+            </a:r>
+          </a:p>
+          <a:p>
+            <a:pPr lvl="2" fontAlgn="base">
+              <a:buClr>
+                <a:schemeClr val="tx2"/>
+              </a:buClr>
+            </a:pPr>
+            <a:r>
+              <a:rPr lang="en-US" altLang="en-US" sz="1200" dirty="0">
+                <a:solidFill>
+                  <a:srgbClr val="000000"/>
+                </a:solidFill>
+                <a:latin typeface="Source Code Pro"/>
+              </a:rPr>
+              <a:t>	.paths( </a:t>
+            </a:r>
+            <a:r>
+              <a:rPr lang="en-US" altLang="en-US" sz="1200" dirty="0" err="1">
+                <a:solidFill>
+                  <a:srgbClr val="000000"/>
+                </a:solidFill>
+                <a:latin typeface="Source Code Pro"/>
+              </a:rPr>
+              <a:t>PathSelectors.</a:t>
+            </a:r>
+            <a:r>
+              <a:rPr lang="en-US" altLang="en-US" sz="1200" i="1" dirty="0" err="1">
+                <a:solidFill>
+                  <a:srgbClr val="000000"/>
+                </a:solidFill>
+                <a:latin typeface="Source Code Pro"/>
+              </a:rPr>
+              <a:t>any</a:t>
+            </a:r>
+            <a:r>
+              <a:rPr lang="en-US" altLang="en-US" sz="1200" dirty="0">
+                <a:solidFill>
+                  <a:srgbClr val="000000"/>
+                </a:solidFill>
+                <a:latin typeface="Source Code Pro"/>
+              </a:rPr>
+              <a:t>() )</a:t>
+            </a:r>
+            <a:br>
+              <a:rPr lang="en-US" altLang="en-US" sz="1200" dirty="0">
+                <a:solidFill>
+                  <a:srgbClr val="000000"/>
+                </a:solidFill>
+                <a:latin typeface="Source Code Pro"/>
+              </a:rPr>
+            </a:br>
+            <a:r>
+              <a:rPr lang="en-US" altLang="en-US" sz="1200" dirty="0">
+                <a:solidFill>
+                  <a:srgbClr val="000000"/>
+                </a:solidFill>
+                <a:latin typeface="Source Code Pro"/>
+              </a:rPr>
+              <a:t>        .build();</a:t>
+            </a:r>
+            <a:br>
+              <a:rPr lang="en-US" altLang="en-US" sz="1200" dirty="0">
+                <a:solidFill>
+                  <a:srgbClr val="000000"/>
+                </a:solidFill>
+                <a:latin typeface="Source Code Pro"/>
+              </a:rPr>
+            </a:br>
+            <a:r>
+              <a:rPr lang="en-US" altLang="en-US" sz="1200" dirty="0">
+                <a:solidFill>
+                  <a:srgbClr val="000000"/>
+                </a:solidFill>
+                <a:latin typeface="Source Code Pro"/>
+              </a:rPr>
+              <a:t>}</a:t>
+            </a:r>
+            <a:endParaRPr lang="en-US" dirty="0">
+              <a:latin typeface="Consolas" panose="020B0609020204030204" pitchFamily="49" charset="0"/>
+              <a:cs typeface="Consolas" panose="020B0609020204030204" pitchFamily="49" charset="0"/>
+            </a:endParaRPr>
+          </a:p>
+        </p:txBody>
+      </p:sp>
+    </p:spTree>
+    <p:extLst>
+      <p:ext uri="{BB962C8B-B14F-4D97-AF65-F5344CB8AC3E}">
+        <p14:creationId xmlns:p14="http://schemas.microsoft.com/office/powerpoint/2010/main" val="828683757"/>
+      </p:ext>
+    </p:extLst>
+  </p:cSld>
+  <p:clrMapOvr>
+    <a:masterClrMapping/>
+  </p:clrMapOvr>
+</p:sld>
+</file>
+
+<file path=ppt/slides/slide13.xml><?xml version="1.0" encoding="utf-8"?>
+<p:sld xmlns:a="http://schemas.openxmlformats.org/drawingml/2006/main" xmlns:r="http://schemas.openxmlformats.org/officeDocument/2006/relationships" xmlns:p="http://schemas.openxmlformats.org/presentationml/2006/main">
+  <p:cSld>
+    <p:spTree>
+      <p:nvGrpSpPr>
+        <p:cNvPr id="1" name=""/>
+        <p:cNvGrpSpPr/>
+        <p:nvPr/>
+      </p:nvGrpSpPr>
+      <p:grpSpPr>
+        <a:xfrm>
+          <a:off x="0" y="0"/>
+          <a:ext cx="0" cy="0"/>
+          <a:chOff x="0" y="0"/>
+          <a:chExt cx="0" cy="0"/>
+        </a:xfrm>
+      </p:grpSpPr>
+      <p:sp>
+        <p:nvSpPr>
+          <p:cNvPr id="2" name="Textplatzhalter 1"/>
+          <p:cNvSpPr>
+            <a:spLocks noGrp="1"/>
+          </p:cNvSpPr>
+          <p:nvPr>
+            <p:ph type="body" sz="quarter" idx="16"/>
+          </p:nvPr>
+        </p:nvSpPr>
+        <p:spPr/>
+        <p:txBody>
+          <a:bodyPr/>
+          <a:lstStyle/>
+          <a:p>
+            <a:r>
+              <a:rPr lang="de-DE" dirty="0"/>
+              <a:t>SWAGGER </a:t>
+            </a:r>
+          </a:p>
+        </p:txBody>
+      </p:sp>
+      <p:sp>
+        <p:nvSpPr>
+          <p:cNvPr id="3" name="Textplatzhalter 2"/>
+          <p:cNvSpPr>
+            <a:spLocks noGrp="1"/>
+          </p:cNvSpPr>
+          <p:nvPr>
+            <p:ph type="body" sz="quarter" idx="15"/>
+          </p:nvPr>
+        </p:nvSpPr>
+        <p:spPr/>
+        <p:txBody>
+          <a:bodyPr/>
+          <a:lstStyle/>
+          <a:p>
+            <a:r>
+              <a:rPr lang="de-DE" dirty="0"/>
+              <a:t>API DOcumentation</a:t>
+            </a:r>
+          </a:p>
+        </p:txBody>
+      </p:sp>
+      <p:sp>
+        <p:nvSpPr>
+          <p:cNvPr id="6" name="Rectangle 1">
+            <a:extLst>
+              <a:ext uri="{FF2B5EF4-FFF2-40B4-BE49-F238E27FC236}">
+                <a16:creationId xmlns:a16="http://schemas.microsoft.com/office/drawing/2014/main" id="{0441C3E8-F8F2-4438-AC0E-DB0D8FA3D95C}"/>
+              </a:ext>
+            </a:extLst>
+          </p:cNvPr>
+          <p:cNvSpPr>
+            <a:spLocks noChangeArrowheads="1"/>
+          </p:cNvSpPr>
+          <p:nvPr/>
+        </p:nvSpPr>
+        <p:spPr bwMode="auto">
+          <a:xfrm>
+            <a:off x="0" y="43934"/>
+            <a:ext cx="184731" cy="369332"/>
+          </a:xfrm>
+          <a:prstGeom prst="rect">
+            <a:avLst/>
+          </a:prstGeom>
+          <a:solidFill>
+            <a:srgbClr val="FFFFFF"/>
+          </a:solidFill>
+          <a:ln>
+            <a:noFill/>
+          </a:ln>
+          <a:effectLst/>
+          <a:extLst>
+            <a:ext uri="{91240B29-F687-4F45-9708-019B960494DF}">
+              <a14:hiddenLine xmlns:a14="http://schemas.microsoft.com/office/drawing/2010/main" w="9525">
+                <a:solidFill>
+                  <a:schemeClr val="tx1"/>
+                </a:solidFill>
+                <a:miter lim="800000"/>
+                <a:headEnd/>
+                <a:tailEnd/>
+              </a14:hiddenLine>
+            </a:ext>
+            <a:ext uri="{AF507438-7753-43E0-B8FC-AC1667EBCBE1}">
+              <a14:hiddenEffects xmlns:a14="http://schemas.microsoft.com/office/drawing/2010/main">
+                <a:effectLst>
+                  <a:outerShdw dist="35921" dir="2700000" algn="ctr" rotWithShape="0">
+                    <a:schemeClr val="bg2"/>
+                  </a:outerShdw>
+                </a:effectLst>
+              </a14:hiddenEffects>
+            </a:ext>
+          </a:extLst>
+        </p:spPr>
+        <p:txBody>
+          <a:bodyPr vert="horz" wrap="none" lIns="91440" tIns="45720" rIns="91440" bIns="45720" numCol="1" anchor="ctr" anchorCtr="0" compatLnSpc="1">
+            <a:prstTxWarp prst="textNoShape">
+              <a:avLst/>
+            </a:prstTxWarp>
+            <a:spAutoFit/>
+          </a:bodyPr>
+          <a:lstStyle/>
+          <a:p>
+            <a:pPr marL="0" marR="0" lvl="0" indent="0" algn="l" defTabSz="914400" rtl="0" eaLnBrk="0" fontAlgn="base" latinLnBrk="0" hangingPunct="0">
+              <a:lnSpc>
+                <a:spcPct val="100000"/>
+              </a:lnSpc>
+              <a:spcBef>
+                <a:spcPct val="0"/>
+              </a:spcBef>
+              <a:spcAft>
+                <a:spcPct val="0"/>
+              </a:spcAft>
+              <a:buClrTx/>
+              <a:buSzTx/>
+              <a:buFontTx/>
+              <a:buNone/>
+              <a:tabLst/>
+            </a:pPr>
+            <a:endParaRPr kumimoji="0" lang="en-US" altLang="en-US" sz="1800" b="0" i="0" u="none" strike="noStrike" cap="none" normalizeH="0" baseline="0" dirty="0">
+              <a:ln>
+                <a:noFill/>
+              </a:ln>
+              <a:solidFill>
+                <a:schemeClr val="tx1"/>
+              </a:solidFill>
+              <a:effectLst/>
+              <a:latin typeface="Arial" panose="020B0604020202020204" pitchFamily="34" charset="0"/>
+            </a:endParaRPr>
+          </a:p>
+        </p:txBody>
+      </p:sp>
+      <p:sp>
+        <p:nvSpPr>
+          <p:cNvPr id="8" name="Rectangle 7">
+            <a:extLst>
+              <a:ext uri="{FF2B5EF4-FFF2-40B4-BE49-F238E27FC236}">
+                <a16:creationId xmlns:a16="http://schemas.microsoft.com/office/drawing/2014/main" id="{10D24712-897D-4BD4-86F1-A4AC878BF7A9}"/>
+              </a:ext>
+            </a:extLst>
+          </p:cNvPr>
+          <p:cNvSpPr/>
+          <p:nvPr/>
+        </p:nvSpPr>
+        <p:spPr>
+          <a:xfrm>
+            <a:off x="1128489" y="1198881"/>
+            <a:ext cx="6781681" cy="2769989"/>
+          </a:xfrm>
+          <a:prstGeom prst="rect">
+            <a:avLst/>
+          </a:prstGeom>
+        </p:spPr>
+        <p:txBody>
+          <a:bodyPr wrap="square">
+            <a:spAutoFit/>
+          </a:bodyPr>
+          <a:lstStyle/>
+          <a:p>
+            <a:pPr marL="285750" indent="-285750" fontAlgn="base">
+              <a:buClr>
+                <a:schemeClr val="tx2"/>
+              </a:buClr>
+              <a:buFont typeface="Wingdings" panose="05000000000000000000" pitchFamily="2" charset="2"/>
+              <a:buChar char="Ø"/>
+            </a:pPr>
+            <a:r>
+              <a:rPr lang="en-US" sz="1200" dirty="0">
+                <a:latin typeface="Consolas" panose="020B0609020204030204" pitchFamily="49" charset="0"/>
+                <a:cs typeface="Consolas" panose="020B0609020204030204" pitchFamily="49" charset="0"/>
+              </a:rPr>
+              <a:t>After Swagger setup, it provides minimal documentation:</a:t>
+            </a:r>
+          </a:p>
+          <a:p>
+            <a:pPr marL="628601" lvl="1" indent="-285750" fontAlgn="base">
+              <a:buClr>
+                <a:schemeClr val="tx2"/>
+              </a:buClr>
+              <a:buFont typeface="Wingdings" panose="05000000000000000000" pitchFamily="2" charset="2"/>
+              <a:buChar char="Ø"/>
+            </a:pPr>
+            <a:r>
+              <a:rPr lang="en-US" dirty="0">
+                <a:latin typeface="Consolas" panose="020B0609020204030204" pitchFamily="49" charset="0"/>
+                <a:cs typeface="Consolas" panose="020B0609020204030204" pitchFamily="49" charset="0"/>
+              </a:rPr>
+              <a:t>Available REST endpoints</a:t>
+            </a:r>
+          </a:p>
+          <a:p>
+            <a:pPr marL="628601" lvl="1" indent="-285750" fontAlgn="base">
+              <a:buClr>
+                <a:schemeClr val="tx2"/>
+              </a:buClr>
+              <a:buFont typeface="Wingdings" panose="05000000000000000000" pitchFamily="2" charset="2"/>
+              <a:buChar char="Ø"/>
+            </a:pPr>
+            <a:r>
+              <a:rPr lang="en-US" dirty="0">
+                <a:latin typeface="Consolas" panose="020B0609020204030204" pitchFamily="49" charset="0"/>
+                <a:cs typeface="Consolas" panose="020B0609020204030204" pitchFamily="49" charset="0"/>
+              </a:rPr>
+              <a:t>Methods per rest points</a:t>
+            </a:r>
+          </a:p>
+          <a:p>
+            <a:pPr marL="628601" lvl="1" indent="-285750" fontAlgn="base">
+              <a:buClr>
+                <a:schemeClr val="tx2"/>
+              </a:buClr>
+              <a:buFont typeface="Wingdings" panose="05000000000000000000" pitchFamily="2" charset="2"/>
+              <a:buChar char="Ø"/>
+            </a:pPr>
+            <a:r>
+              <a:rPr lang="en-US" dirty="0">
+                <a:latin typeface="Consolas" panose="020B0609020204030204" pitchFamily="49" charset="0"/>
+                <a:cs typeface="Consolas" panose="020B0609020204030204" pitchFamily="49" charset="0"/>
+              </a:rPr>
+              <a:t>Response/request models info</a:t>
+            </a:r>
+          </a:p>
+          <a:p>
+            <a:pPr marL="285750" indent="-285750" fontAlgn="base">
+              <a:buClr>
+                <a:schemeClr val="tx2"/>
+              </a:buClr>
+              <a:buFont typeface="Wingdings" panose="05000000000000000000" pitchFamily="2" charset="2"/>
+              <a:buChar char="Ø"/>
+            </a:pPr>
+            <a:r>
+              <a:rPr lang="en-US" dirty="0">
+                <a:latin typeface="Consolas" panose="020B0609020204030204" pitchFamily="49" charset="0"/>
+                <a:cs typeface="Consolas" panose="020B0609020204030204" pitchFamily="49" charset="0"/>
+              </a:rPr>
+              <a:t>To providing more information about endpoints and models we use swagger annotation:</a:t>
+            </a:r>
+          </a:p>
+          <a:p>
+            <a:pPr marL="628601" lvl="1" indent="-285750" fontAlgn="base">
+              <a:buClr>
+                <a:schemeClr val="tx2"/>
+              </a:buClr>
+              <a:buFont typeface="Wingdings" panose="05000000000000000000" pitchFamily="2" charset="2"/>
+              <a:buChar char="Ø"/>
+            </a:pPr>
+            <a:r>
+              <a:rPr lang="en-US" dirty="0">
+                <a:latin typeface="Consolas" panose="020B0609020204030204" pitchFamily="49" charset="0"/>
+                <a:cs typeface="Consolas" panose="020B0609020204030204" pitchFamily="49" charset="0"/>
+              </a:rPr>
+              <a:t>Documenting </a:t>
+            </a:r>
+            <a:r>
+              <a:rPr lang="en-US" dirty="0">
+                <a:latin typeface="Consolas" panose="020B0609020204030204" pitchFamily="49" charset="0"/>
+                <a:cs typeface="Consolas" panose="020B0609020204030204" pitchFamily="49" charset="0"/>
+                <a:hlinkClick r:id="rId3"/>
+              </a:rPr>
+              <a:t>endpoint</a:t>
+            </a:r>
+            <a:r>
+              <a:rPr lang="en-US" dirty="0">
+                <a:latin typeface="Consolas" panose="020B0609020204030204" pitchFamily="49" charset="0"/>
+                <a:cs typeface="Consolas" panose="020B0609020204030204" pitchFamily="49" charset="0"/>
+              </a:rPr>
+              <a:t>:</a:t>
+            </a:r>
+          </a:p>
+          <a:p>
+            <a:pPr marL="971452" lvl="2" indent="-285750" fontAlgn="base">
+              <a:buClr>
+                <a:schemeClr val="tx2"/>
+              </a:buClr>
+              <a:buFont typeface="Wingdings" panose="05000000000000000000" pitchFamily="2" charset="2"/>
+              <a:buChar char="Ø"/>
+            </a:pPr>
+            <a:r>
+              <a:rPr lang="en-US" dirty="0">
+                <a:latin typeface="Consolas" panose="020B0609020204030204" pitchFamily="49" charset="0"/>
+                <a:cs typeface="Consolas" panose="020B0609020204030204" pitchFamily="49" charset="0"/>
+              </a:rPr>
+              <a:t>@</a:t>
+            </a:r>
+            <a:r>
+              <a:rPr lang="en-US" dirty="0" err="1">
+                <a:latin typeface="Consolas" panose="020B0609020204030204" pitchFamily="49" charset="0"/>
+                <a:cs typeface="Consolas" panose="020B0609020204030204" pitchFamily="49" charset="0"/>
+              </a:rPr>
+              <a:t>Api</a:t>
+            </a:r>
+            <a:r>
+              <a:rPr lang="en-US" dirty="0">
+                <a:latin typeface="Consolas" panose="020B0609020204030204" pitchFamily="49" charset="0"/>
+                <a:cs typeface="Consolas" panose="020B0609020204030204" pitchFamily="49" charset="0"/>
+              </a:rPr>
+              <a:t> – document resource</a:t>
+            </a:r>
+          </a:p>
+          <a:p>
+            <a:pPr marL="971452" lvl="2" indent="-285750" fontAlgn="base">
+              <a:buClr>
+                <a:schemeClr val="tx2"/>
+              </a:buClr>
+              <a:buFont typeface="Wingdings" panose="05000000000000000000" pitchFamily="2" charset="2"/>
+              <a:buChar char="Ø"/>
+            </a:pPr>
+            <a:r>
+              <a:rPr lang="en-US" dirty="0">
+                <a:latin typeface="Consolas" panose="020B0609020204030204" pitchFamily="49" charset="0"/>
+                <a:cs typeface="Consolas" panose="020B0609020204030204" pitchFamily="49" charset="0"/>
+              </a:rPr>
+              <a:t>@</a:t>
+            </a:r>
+            <a:r>
+              <a:rPr lang="en-US" dirty="0" err="1">
+                <a:latin typeface="Consolas" panose="020B0609020204030204" pitchFamily="49" charset="0"/>
+                <a:cs typeface="Consolas" panose="020B0609020204030204" pitchFamily="49" charset="0"/>
+              </a:rPr>
+              <a:t>ApiOperation</a:t>
+            </a:r>
+            <a:r>
+              <a:rPr lang="en-US" dirty="0">
+                <a:latin typeface="Consolas" panose="020B0609020204030204" pitchFamily="49" charset="0"/>
+                <a:cs typeface="Consolas" panose="020B0609020204030204" pitchFamily="49" charset="0"/>
+              </a:rPr>
+              <a:t>, @</a:t>
+            </a:r>
+            <a:r>
+              <a:rPr lang="en-US" dirty="0" err="1">
+                <a:latin typeface="Consolas" panose="020B0609020204030204" pitchFamily="49" charset="0"/>
+                <a:cs typeface="Consolas" panose="020B0609020204030204" pitchFamily="49" charset="0"/>
+              </a:rPr>
+              <a:t>ApiResponse</a:t>
+            </a:r>
+            <a:r>
+              <a:rPr lang="en-US" dirty="0">
+                <a:latin typeface="Consolas" panose="020B0609020204030204" pitchFamily="49" charset="0"/>
+                <a:cs typeface="Consolas" panose="020B0609020204030204" pitchFamily="49" charset="0"/>
+              </a:rPr>
+              <a:t> – document methods</a:t>
+            </a:r>
+          </a:p>
+          <a:p>
+            <a:pPr marL="628601" lvl="1" indent="-285750" fontAlgn="base">
+              <a:buClr>
+                <a:schemeClr val="tx2"/>
+              </a:buClr>
+              <a:buFont typeface="Wingdings" panose="05000000000000000000" pitchFamily="2" charset="2"/>
+              <a:buChar char="Ø"/>
+            </a:pPr>
+            <a:r>
+              <a:rPr lang="en-US" dirty="0">
+                <a:latin typeface="Consolas" panose="020B0609020204030204" pitchFamily="49" charset="0"/>
+                <a:cs typeface="Consolas" panose="020B0609020204030204" pitchFamily="49" charset="0"/>
+              </a:rPr>
+              <a:t>Documenting </a:t>
+            </a:r>
+            <a:r>
+              <a:rPr lang="en-US" dirty="0">
+                <a:latin typeface="Consolas" panose="020B0609020204030204" pitchFamily="49" charset="0"/>
+                <a:cs typeface="Consolas" panose="020B0609020204030204" pitchFamily="49" charset="0"/>
+                <a:hlinkClick r:id="rId4"/>
+              </a:rPr>
+              <a:t>model</a:t>
+            </a:r>
+            <a:endParaRPr lang="en-US" dirty="0">
+              <a:latin typeface="Consolas" panose="020B0609020204030204" pitchFamily="49" charset="0"/>
+              <a:cs typeface="Consolas" panose="020B0609020204030204" pitchFamily="49" charset="0"/>
+            </a:endParaRPr>
+          </a:p>
+          <a:p>
+            <a:pPr marL="971452" lvl="2" indent="-285750" fontAlgn="base">
+              <a:buClr>
+                <a:schemeClr val="tx2"/>
+              </a:buClr>
+              <a:buFont typeface="Wingdings" panose="05000000000000000000" pitchFamily="2" charset="2"/>
+              <a:buChar char="Ø"/>
+            </a:pPr>
+            <a:r>
+              <a:rPr lang="en-US" dirty="0">
+                <a:latin typeface="Consolas" panose="020B0609020204030204" pitchFamily="49" charset="0"/>
+                <a:cs typeface="Consolas" panose="020B0609020204030204" pitchFamily="49" charset="0"/>
+              </a:rPr>
+              <a:t>@</a:t>
+            </a:r>
+            <a:r>
+              <a:rPr lang="en-US" dirty="0" err="1">
+                <a:latin typeface="Consolas" panose="020B0609020204030204" pitchFamily="49" charset="0"/>
+                <a:cs typeface="Consolas" panose="020B0609020204030204" pitchFamily="49" charset="0"/>
+              </a:rPr>
+              <a:t>ApiModel</a:t>
+            </a:r>
+            <a:r>
+              <a:rPr lang="en-US" dirty="0">
+                <a:latin typeface="Consolas" panose="020B0609020204030204" pitchFamily="49" charset="0"/>
+                <a:cs typeface="Consolas" panose="020B0609020204030204" pitchFamily="49" charset="0"/>
+              </a:rPr>
+              <a:t> – document </a:t>
+            </a:r>
+            <a:r>
+              <a:rPr lang="en-US" dirty="0" err="1">
+                <a:latin typeface="Consolas" panose="020B0609020204030204" pitchFamily="49" charset="0"/>
+                <a:cs typeface="Consolas" panose="020B0609020204030204" pitchFamily="49" charset="0"/>
+              </a:rPr>
+              <a:t>dto</a:t>
+            </a:r>
+            <a:r>
+              <a:rPr lang="en-US" dirty="0">
+                <a:latin typeface="Consolas" panose="020B0609020204030204" pitchFamily="49" charset="0"/>
+                <a:cs typeface="Consolas" panose="020B0609020204030204" pitchFamily="49" charset="0"/>
+              </a:rPr>
+              <a:t> class</a:t>
+            </a:r>
+          </a:p>
+          <a:p>
+            <a:pPr marL="971452" lvl="2" indent="-285750" fontAlgn="base">
+              <a:buClr>
+                <a:schemeClr val="tx2"/>
+              </a:buClr>
+              <a:buFont typeface="Wingdings" panose="05000000000000000000" pitchFamily="2" charset="2"/>
+              <a:buChar char="Ø"/>
+            </a:pPr>
+            <a:r>
+              <a:rPr lang="en-US" dirty="0">
+                <a:latin typeface="Consolas" panose="020B0609020204030204" pitchFamily="49" charset="0"/>
+                <a:cs typeface="Consolas" panose="020B0609020204030204" pitchFamily="49" charset="0"/>
+              </a:rPr>
+              <a:t>@</a:t>
+            </a:r>
+            <a:r>
+              <a:rPr lang="en-US" dirty="0" err="1">
+                <a:latin typeface="Consolas" panose="020B0609020204030204" pitchFamily="49" charset="0"/>
+                <a:cs typeface="Consolas" panose="020B0609020204030204" pitchFamily="49" charset="0"/>
+              </a:rPr>
+              <a:t>ApiModelProperty</a:t>
+            </a:r>
+            <a:r>
+              <a:rPr lang="en-US" dirty="0">
+                <a:latin typeface="Consolas" panose="020B0609020204030204" pitchFamily="49" charset="0"/>
+                <a:cs typeface="Consolas" panose="020B0609020204030204" pitchFamily="49" charset="0"/>
+              </a:rPr>
+              <a:t> – document property of </a:t>
+            </a:r>
+            <a:r>
+              <a:rPr lang="en-US" dirty="0" err="1">
+                <a:latin typeface="Consolas" panose="020B0609020204030204" pitchFamily="49" charset="0"/>
+                <a:cs typeface="Consolas" panose="020B0609020204030204" pitchFamily="49" charset="0"/>
+              </a:rPr>
+              <a:t>dto</a:t>
+            </a:r>
+            <a:endParaRPr lang="en-US" dirty="0">
+              <a:latin typeface="Consolas" panose="020B0609020204030204" pitchFamily="49" charset="0"/>
+              <a:cs typeface="Consolas" panose="020B0609020204030204" pitchFamily="49" charset="0"/>
+            </a:endParaRPr>
+          </a:p>
+          <a:p>
+            <a:pPr marL="285750" indent="-285750" fontAlgn="base">
+              <a:buClr>
+                <a:schemeClr val="tx2"/>
+              </a:buClr>
+              <a:buFont typeface="Wingdings" panose="05000000000000000000" pitchFamily="2" charset="2"/>
+              <a:buChar char="Ø"/>
+            </a:pPr>
+            <a:r>
+              <a:rPr lang="en-US" dirty="0">
+                <a:latin typeface="Consolas" panose="020B0609020204030204" pitchFamily="49" charset="0"/>
+                <a:cs typeface="Consolas" panose="020B0609020204030204" pitchFamily="49" charset="0"/>
+              </a:rPr>
+              <a:t>Access </a:t>
+            </a:r>
+            <a:r>
+              <a:rPr lang="en-US" dirty="0" err="1">
+                <a:latin typeface="Consolas" panose="020B0609020204030204" pitchFamily="49" charset="0"/>
+                <a:cs typeface="Consolas" panose="020B0609020204030204" pitchFamily="49" charset="0"/>
+              </a:rPr>
+              <a:t>SwaggerUI</a:t>
+            </a:r>
+            <a:r>
+              <a:rPr lang="en-US">
+                <a:latin typeface="Consolas" panose="020B0609020204030204" pitchFamily="49" charset="0"/>
+                <a:cs typeface="Consolas" panose="020B0609020204030204" pitchFamily="49" charset="0"/>
+              </a:rPr>
+              <a:t>: </a:t>
+            </a:r>
+            <a:r>
+              <a:rPr lang="en-US" dirty="0">
+                <a:latin typeface="Consolas" panose="020B0609020204030204" pitchFamily="49" charset="0"/>
+                <a:cs typeface="Consolas" panose="020B0609020204030204" pitchFamily="49" charset="0"/>
+              </a:rPr>
+              <a:t>http://localhost:8080/swagger-ui.html</a:t>
+            </a:r>
+          </a:p>
+        </p:txBody>
+      </p:sp>
+    </p:spTree>
+    <p:extLst>
+      <p:ext uri="{BB962C8B-B14F-4D97-AF65-F5344CB8AC3E}">
+        <p14:creationId xmlns:p14="http://schemas.microsoft.com/office/powerpoint/2010/main" val="1142678753"/>
       </p:ext>
     </p:extLst>
   </p:cSld>

</xml_diff>

<commit_message>
generic covnereter, fix import error
</commit_message>
<xml_diff>
--- a/documentation/Spring_HATEOAS.pptx
+++ b/documentation/Spring_HATEOAS.pptx
@@ -276,7 +276,7 @@
           <a:p>
             <a:fld id="{78617FD8-3C79-8D45-A2C8-4B6BBD51E2EE}" type="datetimeFigureOut">
               <a:rPr lang="de-DE" smtClean="0"/>
-              <a:t>05.03.2018</a:t>
+              <a:t>06.03.2018</a:t>
             </a:fld>
             <a:endParaRPr lang="de-DE"/>
           </a:p>
@@ -441,7 +441,7 @@
           <a:p>
             <a:fld id="{74051A69-C562-4FC5-92DC-994CDC1376A2}" type="datetimeFigureOut">
               <a:rPr lang="en-US" smtClean="0"/>
-              <a:t>05.03.2018</a:t>
+              <a:t>06.03.2018</a:t>
             </a:fld>
             <a:endParaRPr lang="en-US"/>
           </a:p>
@@ -13540,18 +13540,11 @@
               <a:t>SwaggerUI</a:t>
             </a:r>
             <a:r>
-              <a:rPr lang="en-US">
-                <a:latin typeface="Consolas" panose="020B0609020204030204" pitchFamily="49" charset="0"/>
-                <a:cs typeface="Consolas" panose="020B0609020204030204" pitchFamily="49" charset="0"/>
-              </a:rPr>
-              <a:t>: </a:t>
-            </a:r>
-            <a:r>
               <a:rPr lang="en-US" dirty="0">
                 <a:latin typeface="Consolas" panose="020B0609020204030204" pitchFamily="49" charset="0"/>
                 <a:cs typeface="Consolas" panose="020B0609020204030204" pitchFamily="49" charset="0"/>
               </a:rPr>
-              <a:t>http://localhost:8080/swagger-ui.html</a:t>
+              <a:t>: http://localhost:8080/swagger-ui.html</a:t>
             </a:r>
           </a:p>
         </p:txBody>

</xml_diff>